<commit_message>
added more Documentation, Diagram(component and sequence), more slides into ppt
</commit_message>
<xml_diff>
--- a/Documentation/Powerpoint/PowerPoint1.pptx
+++ b/Documentation/Powerpoint/PowerPoint1.pptx
@@ -5,13 +5,19 @@
     <p:sldMasterId id="2147483840" r:id="rId1"/>
   </p:sldMasterIdLst>
   <p:notesMasterIdLst>
-    <p:notesMasterId r:id="rId6"/>
+    <p:notesMasterId r:id="rId12"/>
   </p:notesMasterIdLst>
   <p:sldIdLst>
     <p:sldId id="258" r:id="rId2"/>
     <p:sldId id="259" r:id="rId3"/>
-    <p:sldId id="270" r:id="rId4"/>
-    <p:sldId id="271" r:id="rId5"/>
+    <p:sldId id="274" r:id="rId4"/>
+    <p:sldId id="275" r:id="rId5"/>
+    <p:sldId id="278" r:id="rId6"/>
+    <p:sldId id="272" r:id="rId7"/>
+    <p:sldId id="273" r:id="rId8"/>
+    <p:sldId id="270" r:id="rId9"/>
+    <p:sldId id="271" r:id="rId10"/>
+    <p:sldId id="277" r:id="rId11"/>
   </p:sldIdLst>
   <p:sldSz cx="12192000" cy="6858000"/>
   <p:notesSz cx="6858000" cy="9144000"/>
@@ -111,6 +117,24 @@
     </a:lvl9pPr>
   </p:defaultTextStyle>
   <p:extLst>
+    <p:ext uri="{521415D9-36F7-43E2-AB2F-B90AF26B5E84}">
+      <p14:sectionLst xmlns:p14="http://schemas.microsoft.com/office/powerpoint/2010/main">
+        <p14:section name="Default Section" id="{B507F774-7B9C-47EC-B82D-D09FC1A7E744}">
+          <p14:sldIdLst>
+            <p14:sldId id="258"/>
+            <p14:sldId id="259"/>
+            <p14:sldId id="274"/>
+            <p14:sldId id="275"/>
+            <p14:sldId id="278"/>
+            <p14:sldId id="272"/>
+            <p14:sldId id="273"/>
+            <p14:sldId id="270"/>
+            <p14:sldId id="271"/>
+            <p14:sldId id="277"/>
+          </p14:sldIdLst>
+        </p14:section>
+      </p14:sectionLst>
+    </p:ext>
     <p:ext uri="{EFAFB233-063F-42B5-8137-9DF3F51BA10A}">
       <p15:sldGuideLst xmlns:p15="http://schemas.microsoft.com/office/powerpoint/2012/main"/>
     </p:ext>
@@ -200,7 +224,7 @@
           <a:p>
             <a:fld id="{A5C20BB3-3CCB-4FE5-991B-82F6BCB48AF3}" type="datetimeFigureOut">
               <a:rPr lang="en-US" smtClean="0"/>
-              <a:t>4/8/2018</a:t>
+              <a:t>4/11/2018</a:t>
             </a:fld>
             <a:endParaRPr lang="en-US"/>
           </a:p>
@@ -635,7 +659,7 @@
           <a:p>
             <a:fld id="{9E016143-E03C-4CFD-AFDC-14E5BDEA754C}" type="datetimeFigureOut">
               <a:rPr lang="en-US" dirty="0"/>
-              <a:t>4/8/2018</a:t>
+              <a:t>4/11/2018</a:t>
             </a:fld>
             <a:endParaRPr lang="en-US" dirty="0"/>
           </a:p>
@@ -864,7 +888,7 @@
           <a:p>
             <a:fld id="{C033E54A-A8CA-48C1-9504-691B58049D29}" type="datetimeFigureOut">
               <a:rPr lang="en-US" dirty="0"/>
-              <a:t>4/8/2018</a:t>
+              <a:t>4/11/2018</a:t>
             </a:fld>
             <a:endParaRPr lang="en-US" dirty="0"/>
           </a:p>
@@ -1044,7 +1068,7 @@
           <a:p>
             <a:fld id="{B5F6C806-BBF7-471C-9527-881CE2266695}" type="datetimeFigureOut">
               <a:rPr lang="en-US" dirty="0"/>
-              <a:t>4/8/2018</a:t>
+              <a:t>4/11/2018</a:t>
             </a:fld>
             <a:endParaRPr lang="en-US" dirty="0"/>
           </a:p>
@@ -1214,7 +1238,7 @@
           <a:p>
             <a:fld id="{78C94063-DF36-4330-A365-08DA1FA5B7D6}" type="datetimeFigureOut">
               <a:rPr lang="en-US" dirty="0"/>
-              <a:t>4/8/2018</a:t>
+              <a:t>4/11/2018</a:t>
             </a:fld>
             <a:endParaRPr lang="en-US" dirty="0"/>
           </a:p>
@@ -1468,7 +1492,7 @@
           <a:p>
             <a:fld id="{908A7C6C-0F39-4D70-8E8D-FE5B9C95FA73}" type="datetimeFigureOut">
               <a:rPr lang="en-US" dirty="0"/>
-              <a:t>4/8/2018</a:t>
+              <a:t>4/11/2018</a:t>
             </a:fld>
             <a:endParaRPr lang="en-US" dirty="0"/>
           </a:p>
@@ -1794,7 +1818,7 @@
           <a:p>
             <a:fld id="{DFCFA4AC-08CC-42CE-BD01-C191750A04EC}" type="datetimeFigureOut">
               <a:rPr lang="en-US" dirty="0"/>
-              <a:t>4/8/2018</a:t>
+              <a:t>4/11/2018</a:t>
             </a:fld>
             <a:endParaRPr lang="en-US" dirty="0"/>
           </a:p>
@@ -2245,7 +2269,7 @@
           <a:p>
             <a:fld id="{1BA7A723-92A7-435B-B681-F25B092FEFEB}" type="datetimeFigureOut">
               <a:rPr lang="en-US" dirty="0"/>
-              <a:t>4/8/2018</a:t>
+              <a:t>4/11/2018</a:t>
             </a:fld>
             <a:endParaRPr lang="en-US" dirty="0"/>
           </a:p>
@@ -2363,7 +2387,7 @@
           <a:p>
             <a:fld id="{4F170639-886C-4FCF-9EAB-ABB5DA3F3F4A}" type="datetimeFigureOut">
               <a:rPr lang="en-US" dirty="0"/>
-              <a:t>4/8/2018</a:t>
+              <a:t>4/11/2018</a:t>
             </a:fld>
             <a:endParaRPr lang="en-US" dirty="0"/>
           </a:p>
@@ -2458,7 +2482,7 @@
           <a:p>
             <a:fld id="{22230651-31F4-45D2-98AE-A2108F41BC07}" type="datetimeFigureOut">
               <a:rPr lang="en-US" dirty="0"/>
-              <a:t>4/8/2018</a:t>
+              <a:t>4/11/2018</a:t>
             </a:fld>
             <a:endParaRPr lang="en-US" dirty="0"/>
           </a:p>
@@ -2745,7 +2769,7 @@
           <a:p>
             <a:fld id="{6F53789A-C914-4DB1-8815-80B5EC7335C5}" type="datetimeFigureOut">
               <a:rPr lang="en-US" dirty="0"/>
-              <a:t>4/8/2018</a:t>
+              <a:t>4/11/2018</a:t>
             </a:fld>
             <a:endParaRPr lang="en-US" dirty="0"/>
           </a:p>
@@ -3067,7 +3091,7 @@
           <a:p>
             <a:fld id="{5E6440AA-91A0-436F-8FDB-C0F939DCAE21}" type="datetimeFigureOut">
               <a:rPr lang="en-US" dirty="0"/>
-              <a:t>4/8/2018</a:t>
+              <a:t>4/11/2018</a:t>
             </a:fld>
             <a:endParaRPr lang="en-US" dirty="0"/>
           </a:p>
@@ -3321,7 +3345,7 @@
           <a:p>
             <a:fld id="{0E59FD0C-5451-4CA0-86AF-E70AE3279989}" type="datetimeFigureOut">
               <a:rPr lang="en-US" dirty="0"/>
-              <a:t>4/8/2018</a:t>
+              <a:t>4/11/2018</a:t>
             </a:fld>
             <a:endParaRPr lang="en-US" dirty="0"/>
           </a:p>
@@ -4193,6 +4217,290 @@
 </p:sld>
 </file>
 
+<file path=ppt/slides/slide10.xml><?xml version="1.0" encoding="utf-8"?>
+<p:sld xmlns:a="http://schemas.openxmlformats.org/drawingml/2006/main" xmlns:r="http://schemas.openxmlformats.org/officeDocument/2006/relationships" xmlns:p="http://schemas.openxmlformats.org/presentationml/2006/main">
+  <p:cSld>
+    <p:bg>
+      <p:bgPr>
+        <a:solidFill>
+          <a:schemeClr val="bg1"/>
+        </a:solidFill>
+        <a:effectLst/>
+      </p:bgPr>
+    </p:bg>
+    <p:spTree>
+      <p:nvGrpSpPr>
+        <p:cNvPr id="1" name=""/>
+        <p:cNvGrpSpPr/>
+        <p:nvPr/>
+      </p:nvGrpSpPr>
+      <p:grpSpPr>
+        <a:xfrm>
+          <a:off x="0" y="0"/>
+          <a:ext cx="0" cy="0"/>
+          <a:chOff x="0" y="0"/>
+          <a:chExt cx="0" cy="0"/>
+        </a:xfrm>
+      </p:grpSpPr>
+      <p:sp useBgFill="1">
+        <p:nvSpPr>
+          <p:cNvPr id="9" name="Rectangle 8">
+            <a:extLst>
+              <a:ext uri="{FF2B5EF4-FFF2-40B4-BE49-F238E27FC236}">
+                <a16:creationId xmlns:a16="http://schemas.microsoft.com/office/drawing/2014/main" id="{0249BF42-D05C-4553-9417-7B8695759291}"/>
+              </a:ext>
+            </a:extLst>
+          </p:cNvPr>
+          <p:cNvSpPr>
+            <a:spLocks noGrp="1" noRot="1" noChangeAspect="1" noMove="1" noResize="1" noEditPoints="1" noAdjustHandles="1" noChangeArrowheads="1" noChangeShapeType="1" noTextEdit="1"/>
+          </p:cNvSpPr>
+          <p:nvPr>
+            <p:extLst>
+              <p:ext uri="{386F3935-93C4-4BCD-93E2-E3B085C9AB24}">
+                <p16:designElem xmlns:p16="http://schemas.microsoft.com/office/powerpoint/2015/main" val="1"/>
+              </p:ext>
+            </p:extLst>
+          </p:nvPr>
+        </p:nvSpPr>
+        <p:spPr>
+          <a:xfrm>
+            <a:off x="4379654" y="0"/>
+            <a:ext cx="6913185" cy="6858000"/>
+          </a:xfrm>
+          <a:prstGeom prst="rect">
+            <a:avLst/>
+          </a:prstGeom>
+          <a:ln>
+            <a:noFill/>
+          </a:ln>
+        </p:spPr>
+        <p:style>
+          <a:lnRef idx="2">
+            <a:schemeClr val="accent1">
+              <a:shade val="50000"/>
+            </a:schemeClr>
+          </a:lnRef>
+          <a:fillRef idx="1">
+            <a:schemeClr val="accent1"/>
+          </a:fillRef>
+          <a:effectRef idx="0">
+            <a:schemeClr val="accent1"/>
+          </a:effectRef>
+          <a:fontRef idx="minor">
+            <a:schemeClr val="lt1"/>
+          </a:fontRef>
+        </p:style>
+        <p:txBody>
+          <a:bodyPr rtlCol="0" anchor="ctr"/>
+          <a:lstStyle/>
+          <a:p>
+            <a:pPr algn="ctr"/>
+            <a:endParaRPr lang="en-US"/>
+          </a:p>
+        </p:txBody>
+      </p:sp>
+      <p:sp>
+        <p:nvSpPr>
+          <p:cNvPr id="11" name="Rectangle 10">
+            <a:extLst>
+              <a:ext uri="{FF2B5EF4-FFF2-40B4-BE49-F238E27FC236}">
+                <a16:creationId xmlns:a16="http://schemas.microsoft.com/office/drawing/2014/main" id="{93C1483F-490E-4C8A-8765-1F8AF0C67D5F}"/>
+              </a:ext>
+            </a:extLst>
+          </p:cNvPr>
+          <p:cNvSpPr>
+            <a:spLocks noGrp="1" noRot="1" noChangeAspect="1" noMove="1" noResize="1" noEditPoints="1" noAdjustHandles="1" noChangeArrowheads="1" noChangeShapeType="1" noTextEdit="1"/>
+          </p:cNvSpPr>
+          <p:nvPr>
+            <p:extLst>
+              <p:ext uri="{386F3935-93C4-4BCD-93E2-E3B085C9AB24}">
+                <p16:designElem xmlns:p16="http://schemas.microsoft.com/office/powerpoint/2015/main" val="1"/>
+              </p:ext>
+            </p:extLst>
+          </p:nvPr>
+        </p:nvSpPr>
+        <p:spPr>
+          <a:xfrm>
+            <a:off x="643466" y="0"/>
+            <a:ext cx="3736189" cy="6858000"/>
+          </a:xfrm>
+          <a:prstGeom prst="rect">
+            <a:avLst/>
+          </a:prstGeom>
+          <a:solidFill>
+            <a:srgbClr val="292929"/>
+          </a:solidFill>
+          <a:ln>
+            <a:noFill/>
+          </a:ln>
+        </p:spPr>
+        <p:style>
+          <a:lnRef idx="2">
+            <a:schemeClr val="accent1">
+              <a:shade val="50000"/>
+            </a:schemeClr>
+          </a:lnRef>
+          <a:fillRef idx="1">
+            <a:schemeClr val="accent1"/>
+          </a:fillRef>
+          <a:effectRef idx="0">
+            <a:schemeClr val="accent1"/>
+          </a:effectRef>
+          <a:fontRef idx="minor">
+            <a:schemeClr val="lt1"/>
+          </a:fontRef>
+        </p:style>
+        <p:txBody>
+          <a:bodyPr rtlCol="0" anchor="ctr"/>
+          <a:lstStyle/>
+          <a:p>
+            <a:pPr algn="ctr"/>
+            <a:endParaRPr lang="en-US"/>
+          </a:p>
+        </p:txBody>
+      </p:sp>
+      <p:sp>
+        <p:nvSpPr>
+          <p:cNvPr id="13" name="Rectangle 12">
+            <a:extLst>
+              <a:ext uri="{FF2B5EF4-FFF2-40B4-BE49-F238E27FC236}">
+                <a16:creationId xmlns:a16="http://schemas.microsoft.com/office/drawing/2014/main" id="{33801627-6861-4EA9-BE98-E0CE33A894D9}"/>
+              </a:ext>
+            </a:extLst>
+          </p:cNvPr>
+          <p:cNvSpPr>
+            <a:spLocks noGrp="1" noRot="1" noChangeAspect="1" noMove="1" noResize="1" noEditPoints="1" noAdjustHandles="1" noChangeArrowheads="1" noChangeShapeType="1" noTextEdit="1"/>
+          </p:cNvSpPr>
+          <p:nvPr>
+            <p:extLst>
+              <p:ext uri="{386F3935-93C4-4BCD-93E2-E3B085C9AB24}">
+                <p16:designElem xmlns:p16="http://schemas.microsoft.com/office/powerpoint/2015/main" val="1"/>
+              </p:ext>
+            </p:extLst>
+          </p:nvPr>
+        </p:nvSpPr>
+        <p:spPr>
+          <a:xfrm>
+            <a:off x="1" y="0"/>
+            <a:ext cx="643466" cy="6858000"/>
+          </a:xfrm>
+          <a:prstGeom prst="rect">
+            <a:avLst/>
+          </a:prstGeom>
+          <a:solidFill>
+            <a:srgbClr val="0D0D0D"/>
+          </a:solidFill>
+          <a:ln>
+            <a:noFill/>
+          </a:ln>
+        </p:spPr>
+        <p:style>
+          <a:lnRef idx="2">
+            <a:schemeClr val="accent1">
+              <a:shade val="50000"/>
+            </a:schemeClr>
+          </a:lnRef>
+          <a:fillRef idx="1">
+            <a:schemeClr val="accent1"/>
+          </a:fillRef>
+          <a:effectRef idx="0">
+            <a:schemeClr val="accent1"/>
+          </a:effectRef>
+          <a:fontRef idx="minor">
+            <a:schemeClr val="lt1"/>
+          </a:fontRef>
+        </p:style>
+        <p:txBody>
+          <a:bodyPr rtlCol="0" anchor="ctr"/>
+          <a:lstStyle/>
+          <a:p>
+            <a:pPr algn="ctr"/>
+            <a:endParaRPr lang="en-US"/>
+          </a:p>
+        </p:txBody>
+      </p:sp>
+      <p:sp>
+        <p:nvSpPr>
+          <p:cNvPr id="2" name="Title 1"/>
+          <p:cNvSpPr>
+            <a:spLocks noGrp="1"/>
+          </p:cNvSpPr>
+          <p:nvPr>
+            <p:ph type="title"/>
+          </p:nvPr>
+        </p:nvSpPr>
+        <p:spPr>
+          <a:xfrm>
+            <a:off x="965198" y="643466"/>
+            <a:ext cx="3092718" cy="5528734"/>
+          </a:xfrm>
+          <a:noFill/>
+        </p:spPr>
+        <p:txBody>
+          <a:bodyPr anchor="t">
+            <a:normAutofit/>
+          </a:bodyPr>
+          <a:lstStyle/>
+          <a:p>
+            <a:r>
+              <a:rPr lang="en-US" sz="2800" dirty="0">
+                <a:solidFill>
+                  <a:srgbClr val="FFFFFF"/>
+                </a:solidFill>
+              </a:rPr>
+              <a:t>Live demo:</a:t>
+            </a:r>
+          </a:p>
+        </p:txBody>
+      </p:sp>
+      <p:sp>
+        <p:nvSpPr>
+          <p:cNvPr id="3" name="Content Placeholder 2"/>
+          <p:cNvSpPr>
+            <a:spLocks noGrp="1"/>
+          </p:cNvSpPr>
+          <p:nvPr>
+            <p:ph type="body" idx="1"/>
+          </p:nvPr>
+        </p:nvSpPr>
+        <p:spPr>
+          <a:xfrm>
+            <a:off x="4701385" y="643466"/>
+            <a:ext cx="5947985" cy="5571067"/>
+          </a:xfrm>
+        </p:spPr>
+        <p:txBody>
+          <a:bodyPr>
+            <a:normAutofit/>
+          </a:bodyPr>
+          <a:lstStyle/>
+          <a:p>
+            <a:r>
+              <a:rPr lang="de-DE" sz="2400" dirty="0">
+                <a:hlinkClick r:id="rId2"/>
+              </a:rPr>
+              <a:t>http://localhost:3000</a:t>
+            </a:r>
+            <a:endParaRPr lang="de-DE" sz="2400" dirty="0"/>
+          </a:p>
+          <a:p>
+            <a:endParaRPr lang="en-GB" sz="2400" dirty="0"/>
+          </a:p>
+        </p:txBody>
+      </p:sp>
+    </p:spTree>
+    <p:extLst>
+      <p:ext uri="{BB962C8B-B14F-4D97-AF65-F5344CB8AC3E}">
+        <p14:creationId xmlns:p14="http://schemas.microsoft.com/office/powerpoint/2010/main" val="973006457"/>
+      </p:ext>
+    </p:extLst>
+  </p:cSld>
+  <p:clrMapOvr>
+    <a:masterClrMapping/>
+  </p:clrMapOvr>
+</p:sld>
+</file>
+
 <file path=ppt/slides/slide2.xml><?xml version="1.0" encoding="utf-8"?>
 <p:sld xmlns:a="http://schemas.openxmlformats.org/drawingml/2006/main" xmlns:r="http://schemas.openxmlformats.org/officeDocument/2006/relationships" xmlns:p="http://schemas.openxmlformats.org/presentationml/2006/main">
   <p:cSld>
@@ -4459,21 +4767,14 @@
           <a:p>
             <a:r>
               <a:rPr lang="en-US" sz="2400" dirty="0"/>
-              <a:t>UML1</a:t>
+              <a:t>UML</a:t>
             </a:r>
           </a:p>
           <a:p>
             <a:r>
               <a:rPr lang="en-US" sz="2400" dirty="0"/>
-              <a:t>UML2</a:t>
-            </a:r>
-          </a:p>
-          <a:p>
-            <a:r>
-              <a:rPr lang="en-US" sz="2400" dirty="0" err="1"/>
-              <a:t>Werkzeuge</a:t>
-            </a:r>
-            <a:endParaRPr lang="en-US" sz="2400" dirty="0"/>
+              <a:t>Tools</a:t>
+            </a:r>
           </a:p>
           <a:p>
             <a:pPr lvl="1"/>
@@ -4490,16 +4791,15 @@
             </a:r>
           </a:p>
           <a:p>
-            <a:pPr lvl="1"/>
-            <a:r>
-              <a:rPr lang="en-US" sz="2200" dirty="0"/>
-              <a:t>Libraries</a:t>
+            <a:r>
+              <a:rPr lang="en-US" sz="2600" dirty="0"/>
+              <a:t>Lessons-learnt</a:t>
             </a:r>
           </a:p>
           <a:p>
             <a:r>
               <a:rPr lang="en-US" sz="2400" dirty="0"/>
-              <a:t>Lessons-learnt</a:t>
+              <a:t>Live-demo</a:t>
             </a:r>
           </a:p>
         </p:txBody>
@@ -4518,6 +4818,327 @@
 </file>
 
 <file path=ppt/slides/slide3.xml><?xml version="1.0" encoding="utf-8"?>
+<p:sld xmlns:a="http://schemas.openxmlformats.org/drawingml/2006/main" xmlns:r="http://schemas.openxmlformats.org/officeDocument/2006/relationships" xmlns:p="http://schemas.openxmlformats.org/presentationml/2006/main">
+  <p:cSld>
+    <p:spTree>
+      <p:nvGrpSpPr>
+        <p:cNvPr id="1" name=""/>
+        <p:cNvGrpSpPr/>
+        <p:nvPr/>
+      </p:nvGrpSpPr>
+      <p:grpSpPr>
+        <a:xfrm>
+          <a:off x="0" y="0"/>
+          <a:ext cx="0" cy="0"/>
+          <a:chOff x="0" y="0"/>
+          <a:chExt cx="0" cy="0"/>
+        </a:xfrm>
+      </p:grpSpPr>
+      <p:pic>
+        <p:nvPicPr>
+          <p:cNvPr id="5" name="Content Placeholder 4" descr="A screenshot of a cell phone&#10;&#10;Description generated with very high confidence">
+            <a:extLst>
+              <a:ext uri="{FF2B5EF4-FFF2-40B4-BE49-F238E27FC236}">
+                <a16:creationId xmlns:a16="http://schemas.microsoft.com/office/drawing/2014/main" id="{71B5E68A-1F14-411C-B458-CA4C91E92220}"/>
+              </a:ext>
+            </a:extLst>
+          </p:cNvPr>
+          <p:cNvPicPr>
+            <a:picLocks noGrp="1" noChangeAspect="1"/>
+          </p:cNvPicPr>
+          <p:nvPr>
+            <p:ph idx="1"/>
+          </p:nvPr>
+        </p:nvPicPr>
+        <p:blipFill>
+          <a:blip r:embed="rId2"/>
+          <a:stretch>
+            <a:fillRect/>
+          </a:stretch>
+        </p:blipFill>
+        <p:spPr>
+          <a:xfrm>
+            <a:off x="429779" y="350196"/>
+            <a:ext cx="10551123" cy="5946674"/>
+          </a:xfrm>
+        </p:spPr>
+      </p:pic>
+    </p:spTree>
+    <p:extLst>
+      <p:ext uri="{BB962C8B-B14F-4D97-AF65-F5344CB8AC3E}">
+        <p14:creationId xmlns:p14="http://schemas.microsoft.com/office/powerpoint/2010/main" val="99994573"/>
+      </p:ext>
+    </p:extLst>
+  </p:cSld>
+  <p:clrMapOvr>
+    <a:masterClrMapping/>
+  </p:clrMapOvr>
+</p:sld>
+</file>
+
+<file path=ppt/slides/slide4.xml><?xml version="1.0" encoding="utf-8"?>
+<p:sld xmlns:a="http://schemas.openxmlformats.org/drawingml/2006/main" xmlns:r="http://schemas.openxmlformats.org/officeDocument/2006/relationships" xmlns:p="http://schemas.openxmlformats.org/presentationml/2006/main">
+  <p:cSld>
+    <p:spTree>
+      <p:nvGrpSpPr>
+        <p:cNvPr id="1" name=""/>
+        <p:cNvGrpSpPr/>
+        <p:nvPr/>
+      </p:nvGrpSpPr>
+      <p:grpSpPr>
+        <a:xfrm>
+          <a:off x="0" y="0"/>
+          <a:ext cx="0" cy="0"/>
+          <a:chOff x="0" y="0"/>
+          <a:chExt cx="0" cy="0"/>
+        </a:xfrm>
+      </p:grpSpPr>
+      <p:sp>
+        <p:nvSpPr>
+          <p:cNvPr id="2" name="Title 1">
+            <a:extLst>
+              <a:ext uri="{FF2B5EF4-FFF2-40B4-BE49-F238E27FC236}">
+                <a16:creationId xmlns:a16="http://schemas.microsoft.com/office/drawing/2014/main" id="{F9943EB2-158E-4C06-A797-C7931FDA8CA5}"/>
+              </a:ext>
+            </a:extLst>
+          </p:cNvPr>
+          <p:cNvSpPr>
+            <a:spLocks noGrp="1"/>
+          </p:cNvSpPr>
+          <p:nvPr>
+            <p:ph type="title"/>
+          </p:nvPr>
+        </p:nvSpPr>
+        <p:spPr/>
+        <p:txBody>
+          <a:bodyPr/>
+          <a:lstStyle/>
+          <a:p>
+            <a:endParaRPr lang="en-GB"/>
+          </a:p>
+        </p:txBody>
+      </p:sp>
+      <p:pic>
+        <p:nvPicPr>
+          <p:cNvPr id="5" name="Content Placeholder 4" descr="A screenshot of a cell phone&#10;&#10;Description generated with very high confidence">
+            <a:extLst>
+              <a:ext uri="{FF2B5EF4-FFF2-40B4-BE49-F238E27FC236}">
+                <a16:creationId xmlns:a16="http://schemas.microsoft.com/office/drawing/2014/main" id="{E91E0A69-8885-47D6-A74B-C374B33C279F}"/>
+              </a:ext>
+            </a:extLst>
+          </p:cNvPr>
+          <p:cNvPicPr>
+            <a:picLocks noGrp="1" noChangeAspect="1"/>
+          </p:cNvPicPr>
+          <p:nvPr>
+            <p:ph idx="1"/>
+          </p:nvPr>
+        </p:nvPicPr>
+        <p:blipFill>
+          <a:blip r:embed="rId2"/>
+          <a:stretch>
+            <a:fillRect/>
+          </a:stretch>
+        </p:blipFill>
+        <p:spPr>
+          <a:xfrm>
+            <a:off x="335394" y="305453"/>
+            <a:ext cx="10642316" cy="5998070"/>
+          </a:xfrm>
+        </p:spPr>
+      </p:pic>
+    </p:spTree>
+    <p:extLst>
+      <p:ext uri="{BB962C8B-B14F-4D97-AF65-F5344CB8AC3E}">
+        <p14:creationId xmlns:p14="http://schemas.microsoft.com/office/powerpoint/2010/main" val="2035302952"/>
+      </p:ext>
+    </p:extLst>
+  </p:cSld>
+  <p:clrMapOvr>
+    <a:masterClrMapping/>
+  </p:clrMapOvr>
+</p:sld>
+</file>
+
+<file path=ppt/slides/slide5.xml><?xml version="1.0" encoding="utf-8"?>
+<p:sld xmlns:a="http://schemas.openxmlformats.org/drawingml/2006/main" xmlns:r="http://schemas.openxmlformats.org/officeDocument/2006/relationships" xmlns:p="http://schemas.openxmlformats.org/presentationml/2006/main">
+  <p:cSld>
+    <p:spTree>
+      <p:nvGrpSpPr>
+        <p:cNvPr id="1" name=""/>
+        <p:cNvGrpSpPr/>
+        <p:nvPr/>
+      </p:nvGrpSpPr>
+      <p:grpSpPr>
+        <a:xfrm>
+          <a:off x="0" y="0"/>
+          <a:ext cx="0" cy="0"/>
+          <a:chOff x="0" y="0"/>
+          <a:chExt cx="0" cy="0"/>
+        </a:xfrm>
+      </p:grpSpPr>
+      <p:sp>
+        <p:nvSpPr>
+          <p:cNvPr id="2" name="Title 1">
+            <a:extLst>
+              <a:ext uri="{FF2B5EF4-FFF2-40B4-BE49-F238E27FC236}">
+                <a16:creationId xmlns:a16="http://schemas.microsoft.com/office/drawing/2014/main" id="{E059D0FD-46D3-4E40-AAC7-7375835EFC4B}"/>
+              </a:ext>
+            </a:extLst>
+          </p:cNvPr>
+          <p:cNvSpPr>
+            <a:spLocks noGrp="1"/>
+          </p:cNvSpPr>
+          <p:nvPr>
+            <p:ph type="title"/>
+          </p:nvPr>
+        </p:nvSpPr>
+        <p:spPr>
+          <a:xfrm>
+            <a:off x="301593" y="365760"/>
+            <a:ext cx="2791838" cy="380195"/>
+          </a:xfrm>
+        </p:spPr>
+        <p:txBody>
+          <a:bodyPr>
+            <a:normAutofit/>
+          </a:bodyPr>
+          <a:lstStyle/>
+          <a:p>
+            <a:r>
+              <a:rPr lang="en-GB" sz="2000" dirty="0"/>
+              <a:t>component diagram:</a:t>
+            </a:r>
+          </a:p>
+        </p:txBody>
+      </p:sp>
+      <p:pic>
+        <p:nvPicPr>
+          <p:cNvPr id="5" name="Content Placeholder 4" descr="A screenshot of a cell phone&#10;&#10;Description generated with very high confidence">
+            <a:extLst>
+              <a:ext uri="{FF2B5EF4-FFF2-40B4-BE49-F238E27FC236}">
+                <a16:creationId xmlns:a16="http://schemas.microsoft.com/office/drawing/2014/main" id="{D36834F4-A974-46C5-A1AC-62FAC729FAE6}"/>
+              </a:ext>
+            </a:extLst>
+          </p:cNvPr>
+          <p:cNvPicPr>
+            <a:picLocks noGrp="1" noChangeAspect="1"/>
+          </p:cNvPicPr>
+          <p:nvPr>
+            <p:ph idx="1"/>
+          </p:nvPr>
+        </p:nvPicPr>
+        <p:blipFill>
+          <a:blip r:embed="rId2"/>
+          <a:stretch>
+            <a:fillRect/>
+          </a:stretch>
+        </p:blipFill>
+        <p:spPr>
+          <a:xfrm>
+            <a:off x="400211" y="745955"/>
+            <a:ext cx="2175669" cy="4351338"/>
+          </a:xfrm>
+        </p:spPr>
+      </p:pic>
+      <p:pic>
+        <p:nvPicPr>
+          <p:cNvPr id="7" name="Picture 6" descr="A screenshot of a cell phone&#10;&#10;Description generated with very high confidence">
+            <a:extLst>
+              <a:ext uri="{FF2B5EF4-FFF2-40B4-BE49-F238E27FC236}">
+                <a16:creationId xmlns:a16="http://schemas.microsoft.com/office/drawing/2014/main" id="{697605E3-F322-4E7E-A6FA-85A70F751A0F}"/>
+              </a:ext>
+            </a:extLst>
+          </p:cNvPr>
+          <p:cNvPicPr>
+            <a:picLocks noChangeAspect="1"/>
+          </p:cNvPicPr>
+          <p:nvPr/>
+        </p:nvPicPr>
+        <p:blipFill>
+          <a:blip r:embed="rId3"/>
+          <a:stretch>
+            <a:fillRect/>
+          </a:stretch>
+        </p:blipFill>
+        <p:spPr>
+          <a:xfrm>
+            <a:off x="2674498" y="745955"/>
+            <a:ext cx="8477250" cy="5524500"/>
+          </a:xfrm>
+          <a:prstGeom prst="rect">
+            <a:avLst/>
+          </a:prstGeom>
+        </p:spPr>
+      </p:pic>
+      <p:sp>
+        <p:nvSpPr>
+          <p:cNvPr id="8" name="Title 1">
+            <a:extLst>
+              <a:ext uri="{FF2B5EF4-FFF2-40B4-BE49-F238E27FC236}">
+                <a16:creationId xmlns:a16="http://schemas.microsoft.com/office/drawing/2014/main" id="{49EAB165-1A9E-4D59-B5F3-ED725F9B457F}"/>
+              </a:ext>
+            </a:extLst>
+          </p:cNvPr>
+          <p:cNvSpPr txBox="1">
+            <a:spLocks/>
+          </p:cNvSpPr>
+          <p:nvPr/>
+        </p:nvSpPr>
+        <p:spPr>
+          <a:xfrm>
+            <a:off x="5833354" y="365760"/>
+            <a:ext cx="2791838" cy="363809"/>
+          </a:xfrm>
+          <a:prstGeom prst="rect">
+            <a:avLst/>
+          </a:prstGeom>
+        </p:spPr>
+        <p:txBody>
+          <a:bodyPr vert="horz" lIns="91440" tIns="45720" rIns="91440" bIns="45720" rtlCol="0" anchor="b">
+            <a:normAutofit lnSpcReduction="10000"/>
+          </a:bodyPr>
+          <a:lstStyle>
+            <a:lvl1pPr algn="l" defTabSz="914400" rtl="0" eaLnBrk="1" latinLnBrk="0" hangingPunct="1">
+              <a:lnSpc>
+                <a:spcPct val="90000"/>
+              </a:lnSpc>
+              <a:spcBef>
+                <a:spcPct val="0"/>
+              </a:spcBef>
+              <a:buNone/>
+              <a:defRPr sz="4400" kern="1200" spc="-50" baseline="0">
+                <a:solidFill>
+                  <a:schemeClr val="tx1"/>
+                </a:solidFill>
+                <a:latin typeface="+mj-lt"/>
+                <a:ea typeface="+mj-ea"/>
+                <a:cs typeface="+mj-cs"/>
+              </a:defRPr>
+            </a:lvl1pPr>
+          </a:lstStyle>
+          <a:p>
+            <a:r>
+              <a:rPr lang="en-GB" sz="2000" dirty="0"/>
+              <a:t>sequence diagram:</a:t>
+            </a:r>
+          </a:p>
+        </p:txBody>
+      </p:sp>
+    </p:spTree>
+    <p:extLst>
+      <p:ext uri="{BB962C8B-B14F-4D97-AF65-F5344CB8AC3E}">
+        <p14:creationId xmlns:p14="http://schemas.microsoft.com/office/powerpoint/2010/main" val="2330640184"/>
+      </p:ext>
+    </p:extLst>
+  </p:cSld>
+  <p:clrMapOvr>
+    <a:masterClrMapping/>
+  </p:clrMapOvr>
+</p:sld>
+</file>
+
+<file path=ppt/slides/slide6.xml><?xml version="1.0" encoding="utf-8"?>
 <p:sld xmlns:a="http://schemas.openxmlformats.org/drawingml/2006/main" xmlns:r="http://schemas.openxmlformats.org/officeDocument/2006/relationships" xmlns:p="http://schemas.openxmlformats.org/presentationml/2006/main">
   <p:cSld>
     <p:bg>
@@ -4743,12 +5364,12 @@
           <a:lstStyle/>
           <a:p>
             <a:r>
-              <a:rPr lang="en-US" sz="2800" dirty="0">
+              <a:rPr lang="en-US" sz="2800">
                 <a:solidFill>
                   <a:srgbClr val="FFFFFF"/>
                 </a:solidFill>
               </a:rPr>
-              <a:t>Lessons learnt:</a:t>
+              <a:t>Contents</a:t>
             </a:r>
           </a:p>
         </p:txBody>
@@ -4776,80 +5397,67 @@
           <a:lstStyle/>
           <a:p>
             <a:r>
-              <a:rPr lang="en-GB" sz="2400" dirty="0" err="1"/>
-              <a:t>process.env.PORT</a:t>
-            </a:r>
-            <a:endParaRPr lang="en-GB" sz="2400" dirty="0"/>
-          </a:p>
-          <a:p>
-            <a:endParaRPr sz="2400" dirty="0"/>
-          </a:p>
-        </p:txBody>
-      </p:sp>
-      <p:pic>
-        <p:nvPicPr>
-          <p:cNvPr id="4" name="Picture 3">
-            <a:extLst>
-              <a:ext uri="{FF2B5EF4-FFF2-40B4-BE49-F238E27FC236}">
-                <a16:creationId xmlns:a16="http://schemas.microsoft.com/office/drawing/2014/main" id="{6E2B695C-36CE-4EF5-A6D9-83DD59869E5B}"/>
-              </a:ext>
-            </a:extLst>
-          </p:cNvPr>
-          <p:cNvPicPr>
-            <a:picLocks noChangeAspect="1"/>
-          </p:cNvPicPr>
-          <p:nvPr/>
-        </p:nvPicPr>
-        <p:blipFill>
-          <a:blip r:embed="rId2"/>
-          <a:stretch>
-            <a:fillRect/>
-          </a:stretch>
-        </p:blipFill>
-        <p:spPr>
-          <a:xfrm>
-            <a:off x="4596211" y="1165123"/>
-            <a:ext cx="6480072" cy="2521974"/>
-          </a:xfrm>
-          <a:prstGeom prst="rect">
-            <a:avLst/>
-          </a:prstGeom>
-        </p:spPr>
-      </p:pic>
-      <p:pic>
-        <p:nvPicPr>
-          <p:cNvPr id="5" name="Picture 4">
-            <a:extLst>
-              <a:ext uri="{FF2B5EF4-FFF2-40B4-BE49-F238E27FC236}">
-                <a16:creationId xmlns:a16="http://schemas.microsoft.com/office/drawing/2014/main" id="{954FBC18-63AB-49C1-852A-C57366D8B9D2}"/>
-              </a:ext>
-            </a:extLst>
-          </p:cNvPr>
-          <p:cNvPicPr>
-            <a:picLocks noChangeAspect="1"/>
-          </p:cNvPicPr>
-          <p:nvPr/>
-        </p:nvPicPr>
-        <p:blipFill>
-          <a:blip r:embed="rId3"/>
-          <a:stretch>
-            <a:fillRect/>
-          </a:stretch>
-        </p:blipFill>
-        <p:spPr>
-          <a:xfrm>
-            <a:off x="4651878" y="4208754"/>
-            <a:ext cx="6368738" cy="1315286"/>
-          </a:xfrm>
-          <a:prstGeom prst="rect">
-            <a:avLst/>
-          </a:prstGeom>
-        </p:spPr>
-      </p:pic>
+              <a:rPr lang="en-US" sz="2400" dirty="0"/>
+              <a:t>Tools:</a:t>
+            </a:r>
+          </a:p>
+          <a:p>
+            <a:pPr lvl="1"/>
+            <a:r>
+              <a:rPr lang="en-US" sz="2200" dirty="0"/>
+              <a:t>IDE:</a:t>
+            </a:r>
+          </a:p>
+          <a:p>
+            <a:pPr marL="1097280" lvl="4" indent="0">
+              <a:buNone/>
+            </a:pPr>
+            <a:r>
+              <a:rPr lang="en-US" sz="2000" dirty="0"/>
+              <a:t>Carsten: </a:t>
+            </a:r>
+          </a:p>
+          <a:p>
+            <a:pPr marL="1097280" lvl="4" indent="0">
+              <a:buNone/>
+            </a:pPr>
+            <a:r>
+              <a:rPr lang="en-US" sz="2000" dirty="0"/>
+              <a:t>Started with Notepad++, then </a:t>
+            </a:r>
+            <a:r>
+              <a:rPr lang="en-US" sz="2000" dirty="0" err="1"/>
+              <a:t>Nodeclipse</a:t>
+            </a:r>
+            <a:r>
+              <a:rPr lang="en-US" sz="2000" dirty="0"/>
+              <a:t>, </a:t>
+            </a:r>
+          </a:p>
+          <a:p>
+            <a:pPr marL="1097280" lvl="4" indent="0">
+              <a:buNone/>
+            </a:pPr>
+            <a:r>
+              <a:rPr lang="en-US" sz="2000" dirty="0"/>
+              <a:t>stuck with Visual Studio Code</a:t>
+            </a:r>
+          </a:p>
+          <a:p>
+            <a:pPr marL="1097280" lvl="4" indent="0">
+              <a:buNone/>
+            </a:pPr>
+            <a:r>
+              <a:rPr lang="en-US" sz="2000" dirty="0"/>
+              <a:t>	</a:t>
+            </a:r>
+          </a:p>
+        </p:txBody>
+      </p:sp>
     </p:spTree>
     <p:extLst>
       <p:ext uri="{BB962C8B-B14F-4D97-AF65-F5344CB8AC3E}">
-        <p14:creationId xmlns:p14="http://schemas.microsoft.com/office/powerpoint/2010/main" val="2639474258"/>
+        <p14:creationId xmlns:p14="http://schemas.microsoft.com/office/powerpoint/2010/main" val="1493820586"/>
       </p:ext>
     </p:extLst>
   </p:cSld>
@@ -4859,7 +5467,7 @@
 </p:sld>
 </file>
 
-<file path=ppt/slides/slide4.xml><?xml version="1.0" encoding="utf-8"?>
+<file path=ppt/slides/slide7.xml><?xml version="1.0" encoding="utf-8"?>
 <p:sld xmlns:a="http://schemas.openxmlformats.org/drawingml/2006/main" xmlns:r="http://schemas.openxmlformats.org/officeDocument/2006/relationships" xmlns:p="http://schemas.openxmlformats.org/presentationml/2006/main">
   <p:cSld>
     <p:bg>
@@ -5090,7 +5698,7 @@
                   <a:srgbClr val="FFFFFF"/>
                 </a:solidFill>
               </a:rPr>
-              <a:t>Lessons learnt:</a:t>
+              <a:t>Contents</a:t>
             </a:r>
           </a:p>
         </p:txBody>
@@ -5118,19 +5726,518 @@
           <a:lstStyle/>
           <a:p>
             <a:r>
-              <a:rPr lang="en-GB" sz="2400" dirty="0"/>
-              <a:t>Path module</a:t>
-            </a:r>
+              <a:rPr lang="en-US" sz="2400" dirty="0"/>
+              <a:t>Tools:</a:t>
+            </a:r>
+          </a:p>
+          <a:p>
+            <a:pPr marL="1097280" lvl="4" indent="0">
+              <a:buNone/>
+            </a:pPr>
+            <a:r>
+              <a:rPr lang="en-US" sz="2000" dirty="0"/>
+              <a:t>Modules:</a:t>
+            </a:r>
+          </a:p>
+          <a:p>
+            <a:pPr marL="1097280" lvl="4" indent="0">
+              <a:buNone/>
+            </a:pPr>
+            <a:r>
+              <a:rPr lang="en-GB" sz="2000" dirty="0"/>
+              <a:t> "express": "^4.15.2",    </a:t>
+            </a:r>
+          </a:p>
+          <a:p>
+            <a:pPr marL="1097280" lvl="4" indent="0">
+              <a:buNone/>
+            </a:pPr>
+            <a:r>
+              <a:rPr lang="en-GB" sz="2000" dirty="0"/>
+              <a:t>"express-validator": "^5.1.2",    "socket.io": "^2.0.4",   </a:t>
+            </a:r>
+          </a:p>
+          <a:p>
+            <a:pPr marL="1097280" lvl="4" indent="0">
+              <a:buNone/>
+            </a:pPr>
+            <a:r>
+              <a:rPr lang="en-GB" sz="2000" dirty="0"/>
+              <a:t> "socket.io-stream": "^0.9.1"</a:t>
+            </a:r>
+            <a:r>
+              <a:rPr lang="en-US" sz="2000" dirty="0"/>
+              <a:t>	</a:t>
+            </a:r>
+          </a:p>
+          <a:p>
+            <a:pPr marL="1097280" lvl="4" indent="0">
+              <a:buNone/>
+            </a:pPr>
+            <a:endParaRPr lang="en-US" sz="2000" dirty="0"/>
+          </a:p>
+          <a:p>
+            <a:pPr marL="1097280" lvl="4" indent="0">
+              <a:buNone/>
+            </a:pPr>
+            <a:r>
+              <a:rPr lang="en-US" sz="2000" dirty="0"/>
+              <a:t>And our own logicHelper.js as a module</a:t>
+            </a:r>
+          </a:p>
+          <a:p>
+            <a:pPr marL="1097280" lvl="4" indent="0">
+              <a:buNone/>
+            </a:pPr>
+            <a:r>
+              <a:rPr lang="en-GB" sz="2000" dirty="0" err="1">
+                <a:solidFill>
+                  <a:srgbClr val="00B050"/>
+                </a:solidFill>
+                <a:latin typeface="Agency FB" panose="020B0503020202020204" pitchFamily="34" charset="0"/>
+              </a:rPr>
+              <a:t>module.exports</a:t>
+            </a:r>
+            <a:r>
+              <a:rPr lang="en-GB" sz="2000" dirty="0">
+                <a:latin typeface="Agency FB" panose="020B0503020202020204" pitchFamily="34" charset="0"/>
+              </a:rPr>
+              <a:t> = {</a:t>
+            </a:r>
+          </a:p>
+          <a:p>
+            <a:pPr marL="1097280" lvl="4" indent="0">
+              <a:buNone/>
+            </a:pPr>
+            <a:r>
+              <a:rPr lang="en-US" sz="2000" dirty="0">
+                <a:latin typeface="Agency FB" panose="020B0503020202020204" pitchFamily="34" charset="0"/>
+              </a:rPr>
+              <a:t>foo: function(</a:t>
+            </a:r>
+            <a:r>
+              <a:rPr lang="en-US" sz="2000" b="1" dirty="0">
+                <a:latin typeface="Agency FB" panose="020B0503020202020204" pitchFamily="34" charset="0"/>
+              </a:rPr>
+              <a:t>param1, </a:t>
+            </a:r>
+            <a:r>
+              <a:rPr lang="en-US" sz="2000" b="1" dirty="0" err="1">
+                <a:latin typeface="Agency FB" panose="020B0503020202020204" pitchFamily="34" charset="0"/>
+              </a:rPr>
+              <a:t>paramN</a:t>
+            </a:r>
+            <a:r>
+              <a:rPr lang="en-US" sz="2000" dirty="0">
+                <a:latin typeface="Agency FB" panose="020B0503020202020204" pitchFamily="34" charset="0"/>
+              </a:rPr>
+              <a:t>){</a:t>
+            </a:r>
+          </a:p>
+          <a:p>
+            <a:pPr marL="1097280" lvl="4" indent="0">
+              <a:buNone/>
+            </a:pPr>
+            <a:r>
+              <a:rPr lang="en-US" sz="2000" dirty="0">
+                <a:latin typeface="Agency FB" panose="020B0503020202020204" pitchFamily="34" charset="0"/>
+              </a:rPr>
+              <a:t>	},</a:t>
+            </a:r>
+          </a:p>
+          <a:p>
+            <a:pPr marL="1097280" lvl="4" indent="0">
+              <a:buNone/>
+            </a:pPr>
+            <a:r>
+              <a:rPr lang="en-US" sz="2000" dirty="0">
+                <a:latin typeface="Agency FB" panose="020B0503020202020204" pitchFamily="34" charset="0"/>
+              </a:rPr>
+              <a:t>bar: function(</a:t>
+            </a:r>
+            <a:r>
+              <a:rPr lang="en-US" sz="2000" b="1" dirty="0">
+                <a:latin typeface="Agency FB" panose="020B0503020202020204" pitchFamily="34" charset="0"/>
+              </a:rPr>
+              <a:t>param1, </a:t>
+            </a:r>
+            <a:r>
+              <a:rPr lang="en-US" sz="2000" b="1" dirty="0" err="1">
+                <a:latin typeface="Agency FB" panose="020B0503020202020204" pitchFamily="34" charset="0"/>
+              </a:rPr>
+              <a:t>paramN</a:t>
+            </a:r>
+            <a:r>
+              <a:rPr lang="en-US" sz="2000" dirty="0">
+                <a:latin typeface="Agency FB" panose="020B0503020202020204" pitchFamily="34" charset="0"/>
+              </a:rPr>
+              <a:t>){</a:t>
+            </a:r>
+          </a:p>
+          <a:p>
+            <a:pPr marL="1097280" lvl="4" indent="0">
+              <a:buNone/>
+            </a:pPr>
+            <a:r>
+              <a:rPr lang="en-US" sz="2000" dirty="0">
+                <a:latin typeface="Agency FB" panose="020B0503020202020204" pitchFamily="34" charset="0"/>
+              </a:rPr>
+              <a:t>	}</a:t>
+            </a:r>
+          </a:p>
+          <a:p>
+            <a:pPr marL="1097280" lvl="4" indent="0">
+              <a:buNone/>
+            </a:pPr>
+            <a:r>
+              <a:rPr lang="en-US" sz="2000" dirty="0">
+                <a:latin typeface="Agency FB" panose="020B0503020202020204" pitchFamily="34" charset="0"/>
+              </a:rPr>
+              <a:t>};</a:t>
+            </a:r>
+          </a:p>
+          <a:p>
+            <a:pPr marL="1097280" lvl="4" indent="0">
+              <a:buNone/>
+            </a:pPr>
+            <a:r>
+              <a:rPr lang="en-US" sz="2000" dirty="0">
+                <a:latin typeface="Agency FB" panose="020B0503020202020204" pitchFamily="34" charset="0"/>
+              </a:rPr>
+              <a:t>In server.js</a:t>
+            </a:r>
+          </a:p>
+          <a:p>
+            <a:pPr marL="1097280" lvl="4" indent="0">
+              <a:buNone/>
+            </a:pPr>
+            <a:r>
+              <a:rPr lang="en-GB" dirty="0" err="1"/>
+              <a:t>var</a:t>
+            </a:r>
+            <a:r>
+              <a:rPr lang="en-GB" dirty="0"/>
+              <a:t> logic = require</a:t>
+            </a:r>
+            <a:r>
+              <a:rPr lang="en-GB" b="1" dirty="0"/>
+              <a:t>('./</a:t>
+            </a:r>
+            <a:r>
+              <a:rPr lang="en-GB" b="1" dirty="0" err="1"/>
+              <a:t>util</a:t>
+            </a:r>
+            <a:r>
+              <a:rPr lang="en-GB" b="1" dirty="0"/>
+              <a:t>/</a:t>
+            </a:r>
+            <a:r>
+              <a:rPr lang="en-GB" b="1" dirty="0" err="1"/>
+              <a:t>logicHelper</a:t>
+            </a:r>
+            <a:r>
+              <a:rPr lang="en-GB" dirty="0"/>
+              <a:t>')</a:t>
+            </a:r>
+          </a:p>
+          <a:p>
+            <a:pPr marL="1097280" lvl="4" indent="0">
+              <a:buNone/>
+            </a:pPr>
+            <a:endParaRPr lang="en-US" sz="2000" dirty="0">
+              <a:latin typeface="Agency FB" panose="020B0503020202020204" pitchFamily="34" charset="0"/>
+            </a:endParaRPr>
+          </a:p>
+        </p:txBody>
+      </p:sp>
+    </p:spTree>
+    <p:extLst>
+      <p:ext uri="{BB962C8B-B14F-4D97-AF65-F5344CB8AC3E}">
+        <p14:creationId xmlns:p14="http://schemas.microsoft.com/office/powerpoint/2010/main" val="3643064105"/>
+      </p:ext>
+    </p:extLst>
+  </p:cSld>
+  <p:clrMapOvr>
+    <a:masterClrMapping/>
+  </p:clrMapOvr>
+</p:sld>
+</file>
+
+<file path=ppt/slides/slide8.xml><?xml version="1.0" encoding="utf-8"?>
+<p:sld xmlns:a="http://schemas.openxmlformats.org/drawingml/2006/main" xmlns:r="http://schemas.openxmlformats.org/officeDocument/2006/relationships" xmlns:p="http://schemas.openxmlformats.org/presentationml/2006/main">
+  <p:cSld>
+    <p:bg>
+      <p:bgPr>
+        <a:solidFill>
+          <a:schemeClr val="bg1"/>
+        </a:solidFill>
+        <a:effectLst/>
+      </p:bgPr>
+    </p:bg>
+    <p:spTree>
+      <p:nvGrpSpPr>
+        <p:cNvPr id="1" name=""/>
+        <p:cNvGrpSpPr/>
+        <p:nvPr/>
+      </p:nvGrpSpPr>
+      <p:grpSpPr>
+        <a:xfrm>
+          <a:off x="0" y="0"/>
+          <a:ext cx="0" cy="0"/>
+          <a:chOff x="0" y="0"/>
+          <a:chExt cx="0" cy="0"/>
+        </a:xfrm>
+      </p:grpSpPr>
+      <p:sp useBgFill="1">
+        <p:nvSpPr>
+          <p:cNvPr id="9" name="Rectangle 8">
+            <a:extLst>
+              <a:ext uri="{FF2B5EF4-FFF2-40B4-BE49-F238E27FC236}">
+                <a16:creationId xmlns:a16="http://schemas.microsoft.com/office/drawing/2014/main" id="{0249BF42-D05C-4553-9417-7B8695759291}"/>
+              </a:ext>
+            </a:extLst>
+          </p:cNvPr>
+          <p:cNvSpPr>
+            <a:spLocks noGrp="1" noRot="1" noChangeAspect="1" noMove="1" noResize="1" noEditPoints="1" noAdjustHandles="1" noChangeArrowheads="1" noChangeShapeType="1" noTextEdit="1"/>
+          </p:cNvSpPr>
+          <p:nvPr>
+            <p:extLst>
+              <p:ext uri="{386F3935-93C4-4BCD-93E2-E3B085C9AB24}">
+                <p16:designElem xmlns:p16="http://schemas.microsoft.com/office/powerpoint/2015/main" val="1"/>
+              </p:ext>
+            </p:extLst>
+          </p:nvPr>
+        </p:nvSpPr>
+        <p:spPr>
+          <a:xfrm>
+            <a:off x="4379654" y="0"/>
+            <a:ext cx="6913185" cy="6858000"/>
+          </a:xfrm>
+          <a:prstGeom prst="rect">
+            <a:avLst/>
+          </a:prstGeom>
+          <a:ln>
+            <a:noFill/>
+          </a:ln>
+        </p:spPr>
+        <p:style>
+          <a:lnRef idx="2">
+            <a:schemeClr val="accent1">
+              <a:shade val="50000"/>
+            </a:schemeClr>
+          </a:lnRef>
+          <a:fillRef idx="1">
+            <a:schemeClr val="accent1"/>
+          </a:fillRef>
+          <a:effectRef idx="0">
+            <a:schemeClr val="accent1"/>
+          </a:effectRef>
+          <a:fontRef idx="minor">
+            <a:schemeClr val="lt1"/>
+          </a:fontRef>
+        </p:style>
+        <p:txBody>
+          <a:bodyPr rtlCol="0" anchor="ctr"/>
+          <a:lstStyle/>
+          <a:p>
+            <a:pPr algn="ctr"/>
+            <a:endParaRPr lang="en-US"/>
+          </a:p>
+        </p:txBody>
+      </p:sp>
+      <p:sp>
+        <p:nvSpPr>
+          <p:cNvPr id="11" name="Rectangle 10">
+            <a:extLst>
+              <a:ext uri="{FF2B5EF4-FFF2-40B4-BE49-F238E27FC236}">
+                <a16:creationId xmlns:a16="http://schemas.microsoft.com/office/drawing/2014/main" id="{93C1483F-490E-4C8A-8765-1F8AF0C67D5F}"/>
+              </a:ext>
+            </a:extLst>
+          </p:cNvPr>
+          <p:cNvSpPr>
+            <a:spLocks noGrp="1" noRot="1" noChangeAspect="1" noMove="1" noResize="1" noEditPoints="1" noAdjustHandles="1" noChangeArrowheads="1" noChangeShapeType="1" noTextEdit="1"/>
+          </p:cNvSpPr>
+          <p:nvPr>
+            <p:extLst>
+              <p:ext uri="{386F3935-93C4-4BCD-93E2-E3B085C9AB24}">
+                <p16:designElem xmlns:p16="http://schemas.microsoft.com/office/powerpoint/2015/main" val="1"/>
+              </p:ext>
+            </p:extLst>
+          </p:nvPr>
+        </p:nvSpPr>
+        <p:spPr>
+          <a:xfrm>
+            <a:off x="643466" y="0"/>
+            <a:ext cx="3736189" cy="6858000"/>
+          </a:xfrm>
+          <a:prstGeom prst="rect">
+            <a:avLst/>
+          </a:prstGeom>
+          <a:solidFill>
+            <a:srgbClr val="292929"/>
+          </a:solidFill>
+          <a:ln>
+            <a:noFill/>
+          </a:ln>
+        </p:spPr>
+        <p:style>
+          <a:lnRef idx="2">
+            <a:schemeClr val="accent1">
+              <a:shade val="50000"/>
+            </a:schemeClr>
+          </a:lnRef>
+          <a:fillRef idx="1">
+            <a:schemeClr val="accent1"/>
+          </a:fillRef>
+          <a:effectRef idx="0">
+            <a:schemeClr val="accent1"/>
+          </a:effectRef>
+          <a:fontRef idx="minor">
+            <a:schemeClr val="lt1"/>
+          </a:fontRef>
+        </p:style>
+        <p:txBody>
+          <a:bodyPr rtlCol="0" anchor="ctr"/>
+          <a:lstStyle/>
+          <a:p>
+            <a:pPr algn="ctr"/>
+            <a:endParaRPr lang="en-US"/>
+          </a:p>
+        </p:txBody>
+      </p:sp>
+      <p:sp>
+        <p:nvSpPr>
+          <p:cNvPr id="13" name="Rectangle 12">
+            <a:extLst>
+              <a:ext uri="{FF2B5EF4-FFF2-40B4-BE49-F238E27FC236}">
+                <a16:creationId xmlns:a16="http://schemas.microsoft.com/office/drawing/2014/main" id="{33801627-6861-4EA9-BE98-E0CE33A894D9}"/>
+              </a:ext>
+            </a:extLst>
+          </p:cNvPr>
+          <p:cNvSpPr>
+            <a:spLocks noGrp="1" noRot="1" noChangeAspect="1" noMove="1" noResize="1" noEditPoints="1" noAdjustHandles="1" noChangeArrowheads="1" noChangeShapeType="1" noTextEdit="1"/>
+          </p:cNvSpPr>
+          <p:nvPr>
+            <p:extLst>
+              <p:ext uri="{386F3935-93C4-4BCD-93E2-E3B085C9AB24}">
+                <p16:designElem xmlns:p16="http://schemas.microsoft.com/office/powerpoint/2015/main" val="1"/>
+              </p:ext>
+            </p:extLst>
+          </p:nvPr>
+        </p:nvSpPr>
+        <p:spPr>
+          <a:xfrm>
+            <a:off x="1" y="0"/>
+            <a:ext cx="643466" cy="6858000"/>
+          </a:xfrm>
+          <a:prstGeom prst="rect">
+            <a:avLst/>
+          </a:prstGeom>
+          <a:solidFill>
+            <a:srgbClr val="0D0D0D"/>
+          </a:solidFill>
+          <a:ln>
+            <a:noFill/>
+          </a:ln>
+        </p:spPr>
+        <p:style>
+          <a:lnRef idx="2">
+            <a:schemeClr val="accent1">
+              <a:shade val="50000"/>
+            </a:schemeClr>
+          </a:lnRef>
+          <a:fillRef idx="1">
+            <a:schemeClr val="accent1"/>
+          </a:fillRef>
+          <a:effectRef idx="0">
+            <a:schemeClr val="accent1"/>
+          </a:effectRef>
+          <a:fontRef idx="minor">
+            <a:schemeClr val="lt1"/>
+          </a:fontRef>
+        </p:style>
+        <p:txBody>
+          <a:bodyPr rtlCol="0" anchor="ctr"/>
+          <a:lstStyle/>
+          <a:p>
+            <a:pPr algn="ctr"/>
+            <a:endParaRPr lang="en-US"/>
+          </a:p>
+        </p:txBody>
+      </p:sp>
+      <p:sp>
+        <p:nvSpPr>
+          <p:cNvPr id="2" name="Title 1"/>
+          <p:cNvSpPr>
+            <a:spLocks noGrp="1"/>
+          </p:cNvSpPr>
+          <p:nvPr>
+            <p:ph type="title"/>
+          </p:nvPr>
+        </p:nvSpPr>
+        <p:spPr>
+          <a:xfrm>
+            <a:off x="965198" y="643466"/>
+            <a:ext cx="3092718" cy="5528734"/>
+          </a:xfrm>
+          <a:noFill/>
+        </p:spPr>
+        <p:txBody>
+          <a:bodyPr anchor="t">
+            <a:normAutofit/>
+          </a:bodyPr>
+          <a:lstStyle/>
+          <a:p>
+            <a:r>
+              <a:rPr lang="en-US" sz="2800" dirty="0">
+                <a:solidFill>
+                  <a:srgbClr val="FFFFFF"/>
+                </a:solidFill>
+              </a:rPr>
+              <a:t>Lessons learnt:</a:t>
+            </a:r>
+          </a:p>
+        </p:txBody>
+      </p:sp>
+      <p:sp>
+        <p:nvSpPr>
+          <p:cNvPr id="3" name="Content Placeholder 2"/>
+          <p:cNvSpPr>
+            <a:spLocks noGrp="1"/>
+          </p:cNvSpPr>
+          <p:nvPr>
+            <p:ph type="body" idx="1"/>
+          </p:nvPr>
+        </p:nvSpPr>
+        <p:spPr>
+          <a:xfrm>
+            <a:off x="4701385" y="643466"/>
+            <a:ext cx="5947985" cy="5571067"/>
+          </a:xfrm>
+        </p:spPr>
+        <p:txBody>
+          <a:bodyPr>
+            <a:normAutofit/>
+          </a:bodyPr>
+          <a:lstStyle/>
+          <a:p>
+            <a:r>
+              <a:rPr lang="en-GB" sz="2400" dirty="0" err="1"/>
+              <a:t>process.env.PORT</a:t>
+            </a:r>
+            <a:endParaRPr lang="en-GB" sz="2400" dirty="0"/>
+          </a:p>
+          <a:p>
             <a:endParaRPr sz="2400" dirty="0"/>
           </a:p>
         </p:txBody>
       </p:sp>
       <p:pic>
         <p:nvPicPr>
-          <p:cNvPr id="8" name="Picture 7">
+          <p:cNvPr id="4" name="Picture 3">
             <a:extLst>
               <a:ext uri="{FF2B5EF4-FFF2-40B4-BE49-F238E27FC236}">
-                <a16:creationId xmlns:a16="http://schemas.microsoft.com/office/drawing/2014/main" id="{6C45FBAB-5034-49BA-8E9E-FAF51CB5E7CD}"/>
+                <a16:creationId xmlns:a16="http://schemas.microsoft.com/office/drawing/2014/main" id="{6E2B695C-36CE-4EF5-A6D9-83DD59869E5B}"/>
               </a:ext>
             </a:extLst>
           </p:cNvPr>
@@ -5139,19 +6246,401 @@
           </p:cNvPicPr>
           <p:nvPr/>
         </p:nvPicPr>
-        <p:blipFill rotWithShape="1">
+        <p:blipFill>
           <a:blip r:embed="rId2"/>
-          <a:srcRect l="1" r="37844"/>
-          <a:stretch/>
+          <a:stretch>
+            <a:fillRect/>
+          </a:stretch>
         </p:blipFill>
         <p:spPr>
           <a:xfrm>
-            <a:off x="4379647" y="1619899"/>
-            <a:ext cx="8077461" cy="1176642"/>
+            <a:off x="4596211" y="1165123"/>
+            <a:ext cx="6480072" cy="2521974"/>
           </a:xfrm>
           <a:prstGeom prst="rect">
             <a:avLst/>
           </a:prstGeom>
+        </p:spPr>
+      </p:pic>
+      <p:pic>
+        <p:nvPicPr>
+          <p:cNvPr id="5" name="Picture 4">
+            <a:extLst>
+              <a:ext uri="{FF2B5EF4-FFF2-40B4-BE49-F238E27FC236}">
+                <a16:creationId xmlns:a16="http://schemas.microsoft.com/office/drawing/2014/main" id="{954FBC18-63AB-49C1-852A-C57366D8B9D2}"/>
+              </a:ext>
+            </a:extLst>
+          </p:cNvPr>
+          <p:cNvPicPr>
+            <a:picLocks noChangeAspect="1"/>
+          </p:cNvPicPr>
+          <p:nvPr/>
+        </p:nvPicPr>
+        <p:blipFill>
+          <a:blip r:embed="rId3"/>
+          <a:stretch>
+            <a:fillRect/>
+          </a:stretch>
+        </p:blipFill>
+        <p:spPr>
+          <a:xfrm>
+            <a:off x="4651878" y="4208754"/>
+            <a:ext cx="6368738" cy="1315286"/>
+          </a:xfrm>
+          <a:prstGeom prst="rect">
+            <a:avLst/>
+          </a:prstGeom>
+        </p:spPr>
+      </p:pic>
+    </p:spTree>
+    <p:extLst>
+      <p:ext uri="{BB962C8B-B14F-4D97-AF65-F5344CB8AC3E}">
+        <p14:creationId xmlns:p14="http://schemas.microsoft.com/office/powerpoint/2010/main" val="2639474258"/>
+      </p:ext>
+    </p:extLst>
+  </p:cSld>
+  <p:clrMapOvr>
+    <a:masterClrMapping/>
+  </p:clrMapOvr>
+</p:sld>
+</file>
+
+<file path=ppt/slides/slide9.xml><?xml version="1.0" encoding="utf-8"?>
+<p:sld xmlns:a="http://schemas.openxmlformats.org/drawingml/2006/main" xmlns:r="http://schemas.openxmlformats.org/officeDocument/2006/relationships" xmlns:p="http://schemas.openxmlformats.org/presentationml/2006/main">
+  <p:cSld>
+    <p:bg>
+      <p:bgPr>
+        <a:solidFill>
+          <a:schemeClr val="bg1"/>
+        </a:solidFill>
+        <a:effectLst/>
+      </p:bgPr>
+    </p:bg>
+    <p:spTree>
+      <p:nvGrpSpPr>
+        <p:cNvPr id="1" name=""/>
+        <p:cNvGrpSpPr/>
+        <p:nvPr/>
+      </p:nvGrpSpPr>
+      <p:grpSpPr>
+        <a:xfrm>
+          <a:off x="0" y="0"/>
+          <a:ext cx="0" cy="0"/>
+          <a:chOff x="0" y="0"/>
+          <a:chExt cx="0" cy="0"/>
+        </a:xfrm>
+      </p:grpSpPr>
+      <p:sp useBgFill="1">
+        <p:nvSpPr>
+          <p:cNvPr id="9" name="Rectangle 8">
+            <a:extLst>
+              <a:ext uri="{FF2B5EF4-FFF2-40B4-BE49-F238E27FC236}">
+                <a16:creationId xmlns:a16="http://schemas.microsoft.com/office/drawing/2014/main" id="{0249BF42-D05C-4553-9417-7B8695759291}"/>
+              </a:ext>
+            </a:extLst>
+          </p:cNvPr>
+          <p:cNvSpPr>
+            <a:spLocks noGrp="1" noRot="1" noChangeAspect="1" noMove="1" noResize="1" noEditPoints="1" noAdjustHandles="1" noChangeArrowheads="1" noChangeShapeType="1" noTextEdit="1"/>
+          </p:cNvSpPr>
+          <p:nvPr>
+            <p:extLst>
+              <p:ext uri="{386F3935-93C4-4BCD-93E2-E3B085C9AB24}">
+                <p16:designElem xmlns:p16="http://schemas.microsoft.com/office/powerpoint/2015/main" val="1"/>
+              </p:ext>
+            </p:extLst>
+          </p:nvPr>
+        </p:nvSpPr>
+        <p:spPr>
+          <a:xfrm>
+            <a:off x="4379654" y="0"/>
+            <a:ext cx="6913185" cy="6858000"/>
+          </a:xfrm>
+          <a:prstGeom prst="rect">
+            <a:avLst/>
+          </a:prstGeom>
+          <a:ln>
+            <a:noFill/>
+          </a:ln>
+        </p:spPr>
+        <p:style>
+          <a:lnRef idx="2">
+            <a:schemeClr val="accent1">
+              <a:shade val="50000"/>
+            </a:schemeClr>
+          </a:lnRef>
+          <a:fillRef idx="1">
+            <a:schemeClr val="accent1"/>
+          </a:fillRef>
+          <a:effectRef idx="0">
+            <a:schemeClr val="accent1"/>
+          </a:effectRef>
+          <a:fontRef idx="minor">
+            <a:schemeClr val="lt1"/>
+          </a:fontRef>
+        </p:style>
+        <p:txBody>
+          <a:bodyPr rtlCol="0" anchor="ctr"/>
+          <a:lstStyle/>
+          <a:p>
+            <a:pPr algn="ctr"/>
+            <a:endParaRPr lang="en-US"/>
+          </a:p>
+        </p:txBody>
+      </p:sp>
+      <p:sp>
+        <p:nvSpPr>
+          <p:cNvPr id="11" name="Rectangle 10">
+            <a:extLst>
+              <a:ext uri="{FF2B5EF4-FFF2-40B4-BE49-F238E27FC236}">
+                <a16:creationId xmlns:a16="http://schemas.microsoft.com/office/drawing/2014/main" id="{93C1483F-490E-4C8A-8765-1F8AF0C67D5F}"/>
+              </a:ext>
+            </a:extLst>
+          </p:cNvPr>
+          <p:cNvSpPr>
+            <a:spLocks noGrp="1" noRot="1" noChangeAspect="1" noMove="1" noResize="1" noEditPoints="1" noAdjustHandles="1" noChangeArrowheads="1" noChangeShapeType="1" noTextEdit="1"/>
+          </p:cNvSpPr>
+          <p:nvPr>
+            <p:extLst>
+              <p:ext uri="{386F3935-93C4-4BCD-93E2-E3B085C9AB24}">
+                <p16:designElem xmlns:p16="http://schemas.microsoft.com/office/powerpoint/2015/main" val="1"/>
+              </p:ext>
+            </p:extLst>
+          </p:nvPr>
+        </p:nvSpPr>
+        <p:spPr>
+          <a:xfrm>
+            <a:off x="643466" y="0"/>
+            <a:ext cx="3736189" cy="6858000"/>
+          </a:xfrm>
+          <a:prstGeom prst="rect">
+            <a:avLst/>
+          </a:prstGeom>
+          <a:solidFill>
+            <a:srgbClr val="292929"/>
+          </a:solidFill>
+          <a:ln>
+            <a:noFill/>
+          </a:ln>
+        </p:spPr>
+        <p:style>
+          <a:lnRef idx="2">
+            <a:schemeClr val="accent1">
+              <a:shade val="50000"/>
+            </a:schemeClr>
+          </a:lnRef>
+          <a:fillRef idx="1">
+            <a:schemeClr val="accent1"/>
+          </a:fillRef>
+          <a:effectRef idx="0">
+            <a:schemeClr val="accent1"/>
+          </a:effectRef>
+          <a:fontRef idx="minor">
+            <a:schemeClr val="lt1"/>
+          </a:fontRef>
+        </p:style>
+        <p:txBody>
+          <a:bodyPr rtlCol="0" anchor="ctr"/>
+          <a:lstStyle/>
+          <a:p>
+            <a:pPr algn="ctr"/>
+            <a:endParaRPr lang="en-US"/>
+          </a:p>
+        </p:txBody>
+      </p:sp>
+      <p:sp>
+        <p:nvSpPr>
+          <p:cNvPr id="13" name="Rectangle 12">
+            <a:extLst>
+              <a:ext uri="{FF2B5EF4-FFF2-40B4-BE49-F238E27FC236}">
+                <a16:creationId xmlns:a16="http://schemas.microsoft.com/office/drawing/2014/main" id="{33801627-6861-4EA9-BE98-E0CE33A894D9}"/>
+              </a:ext>
+            </a:extLst>
+          </p:cNvPr>
+          <p:cNvSpPr>
+            <a:spLocks noGrp="1" noRot="1" noChangeAspect="1" noMove="1" noResize="1" noEditPoints="1" noAdjustHandles="1" noChangeArrowheads="1" noChangeShapeType="1" noTextEdit="1"/>
+          </p:cNvSpPr>
+          <p:nvPr>
+            <p:extLst>
+              <p:ext uri="{386F3935-93C4-4BCD-93E2-E3B085C9AB24}">
+                <p16:designElem xmlns:p16="http://schemas.microsoft.com/office/powerpoint/2015/main" val="1"/>
+              </p:ext>
+            </p:extLst>
+          </p:nvPr>
+        </p:nvSpPr>
+        <p:spPr>
+          <a:xfrm>
+            <a:off x="1" y="0"/>
+            <a:ext cx="643466" cy="6858000"/>
+          </a:xfrm>
+          <a:prstGeom prst="rect">
+            <a:avLst/>
+          </a:prstGeom>
+          <a:solidFill>
+            <a:srgbClr val="0D0D0D"/>
+          </a:solidFill>
+          <a:ln>
+            <a:noFill/>
+          </a:ln>
+        </p:spPr>
+        <p:style>
+          <a:lnRef idx="2">
+            <a:schemeClr val="accent1">
+              <a:shade val="50000"/>
+            </a:schemeClr>
+          </a:lnRef>
+          <a:fillRef idx="1">
+            <a:schemeClr val="accent1"/>
+          </a:fillRef>
+          <a:effectRef idx="0">
+            <a:schemeClr val="accent1"/>
+          </a:effectRef>
+          <a:fontRef idx="minor">
+            <a:schemeClr val="lt1"/>
+          </a:fontRef>
+        </p:style>
+        <p:txBody>
+          <a:bodyPr rtlCol="0" anchor="ctr"/>
+          <a:lstStyle/>
+          <a:p>
+            <a:pPr algn="ctr"/>
+            <a:endParaRPr lang="en-US"/>
+          </a:p>
+        </p:txBody>
+      </p:sp>
+      <p:sp>
+        <p:nvSpPr>
+          <p:cNvPr id="2" name="Title 1"/>
+          <p:cNvSpPr>
+            <a:spLocks noGrp="1"/>
+          </p:cNvSpPr>
+          <p:nvPr>
+            <p:ph type="title"/>
+          </p:nvPr>
+        </p:nvSpPr>
+        <p:spPr>
+          <a:xfrm>
+            <a:off x="965198" y="643466"/>
+            <a:ext cx="3092718" cy="5528734"/>
+          </a:xfrm>
+          <a:noFill/>
+        </p:spPr>
+        <p:txBody>
+          <a:bodyPr anchor="t">
+            <a:normAutofit/>
+          </a:bodyPr>
+          <a:lstStyle/>
+          <a:p>
+            <a:r>
+              <a:rPr lang="en-US" sz="2800" dirty="0">
+                <a:solidFill>
+                  <a:srgbClr val="FFFFFF"/>
+                </a:solidFill>
+              </a:rPr>
+              <a:t>Lessons learnt:</a:t>
+            </a:r>
+          </a:p>
+        </p:txBody>
+      </p:sp>
+      <p:sp>
+        <p:nvSpPr>
+          <p:cNvPr id="3" name="Content Placeholder 2"/>
+          <p:cNvSpPr>
+            <a:spLocks noGrp="1"/>
+          </p:cNvSpPr>
+          <p:nvPr>
+            <p:ph type="body" idx="1"/>
+          </p:nvPr>
+        </p:nvSpPr>
+        <p:spPr>
+          <a:xfrm>
+            <a:off x="4701385" y="643466"/>
+            <a:ext cx="5947985" cy="5571067"/>
+          </a:xfrm>
+        </p:spPr>
+        <p:txBody>
+          <a:bodyPr>
+            <a:normAutofit/>
+          </a:bodyPr>
+          <a:lstStyle/>
+          <a:p>
+            <a:r>
+              <a:rPr lang="en-GB" sz="2400" dirty="0"/>
+              <a:t>Using node.js “file system” (‘fs’) on client-side is difficult to achieve.</a:t>
+            </a:r>
+          </a:p>
+          <a:p>
+            <a:r>
+              <a:rPr lang="en-GB" sz="2400" dirty="0"/>
+              <a:t>It would require using and implementing ‘</a:t>
+            </a:r>
+            <a:r>
+              <a:rPr lang="en-GB" sz="2400" b="1" dirty="0" err="1"/>
+              <a:t>browserify</a:t>
+            </a:r>
+            <a:r>
+              <a:rPr lang="en-GB" sz="2400" dirty="0"/>
+              <a:t>’ </a:t>
+            </a:r>
+          </a:p>
+          <a:p>
+            <a:endParaRPr lang="en-GB" sz="2400" dirty="0"/>
+          </a:p>
+          <a:p>
+            <a:endParaRPr lang="en-GB" sz="2400" dirty="0"/>
+          </a:p>
+          <a:p>
+            <a:endParaRPr lang="en-GB" sz="2400" dirty="0"/>
+          </a:p>
+          <a:p>
+            <a:endParaRPr lang="en-GB" sz="2400" dirty="0"/>
+          </a:p>
+        </p:txBody>
+      </p:sp>
+      <p:pic>
+        <p:nvPicPr>
+          <p:cNvPr id="1026" name="Picture 2" descr="Image result for browserify">
+            <a:extLst>
+              <a:ext uri="{FF2B5EF4-FFF2-40B4-BE49-F238E27FC236}">
+                <a16:creationId xmlns:a16="http://schemas.microsoft.com/office/drawing/2014/main" id="{3139DB6F-B841-4CC6-8065-E4E7940993E1}"/>
+              </a:ext>
+            </a:extLst>
+          </p:cNvPr>
+          <p:cNvPicPr>
+            <a:picLocks noChangeAspect="1" noChangeArrowheads="1"/>
+          </p:cNvPicPr>
+          <p:nvPr/>
+        </p:nvPicPr>
+        <p:blipFill>
+          <a:blip r:embed="rId2">
+            <a:extLst>
+              <a:ext uri="{28A0092B-C50C-407E-A947-70E740481C1C}">
+                <a14:useLocalDpi xmlns:a14="http://schemas.microsoft.com/office/drawing/2010/main" val="0"/>
+              </a:ext>
+            </a:extLst>
+          </a:blip>
+          <a:srcRect/>
+          <a:stretch>
+            <a:fillRect/>
+          </a:stretch>
+        </p:blipFill>
+        <p:spPr bwMode="auto">
+          <a:xfrm>
+            <a:off x="6096000" y="2622947"/>
+            <a:ext cx="4002172" cy="3325516"/>
+          </a:xfrm>
+          <a:prstGeom prst="rect">
+            <a:avLst/>
+          </a:prstGeom>
+          <a:noFill/>
+          <a:extLst>
+            <a:ext uri="{909E8E84-426E-40DD-AFC4-6F175D3DCCD1}">
+              <a14:hiddenFill xmlns:a14="http://schemas.microsoft.com/office/drawing/2010/main">
+                <a:solidFill>
+                  <a:srgbClr val="FFFFFF"/>
+                </a:solidFill>
+              </a14:hiddenFill>
+            </a:ext>
+          </a:extLst>
         </p:spPr>
       </p:pic>
     </p:spTree>

</xml_diff>